<commit_message>
Update screengrabs in manual
</commit_message>
<xml_diff>
--- a/Doc/Manuel VLM.pptx
+++ b/Doc/Manuel VLM.pptx
@@ -8,6 +8,8 @@
     <p:sldId id="256" r:id="rId2"/>
     <p:sldId id="257" r:id="rId3"/>
     <p:sldId id="258" r:id="rId4"/>
+    <p:sldId id="259" r:id="rId5"/>
+    <p:sldId id="260" r:id="rId6"/>
   </p:sldIdLst>
   <p:sldSz cx="12192000" cy="6858000"/>
   <p:notesSz cx="6858000" cy="9144000"/>
@@ -106,6 +108,11 @@
       </a:defRPr>
     </a:lvl9pPr>
   </p:defaultTextStyle>
+  <p:extLst>
+    <p:ext uri="{EFAFB233-063F-42B5-8137-9DF3F51BA10A}">
+      <p15:sldGuideLst xmlns:p15="http://schemas.microsoft.com/office/powerpoint/2012/main"/>
+    </p:ext>
+  </p:extLst>
 </p:presentation>
 </file>
 
@@ -256,7 +263,7 @@
           <a:p>
             <a:fld id="{D9316CA6-D44A-4CBD-B514-F8E666A3E426}" type="datetimeFigureOut">
               <a:rPr lang="fr-FR" smtClean="0"/>
-              <a:t>26/04/2020</a:t>
+              <a:t>17/05/2020</a:t>
             </a:fld>
             <a:endParaRPr lang="fr-FR"/>
           </a:p>
@@ -454,7 +461,7 @@
           <a:p>
             <a:fld id="{D9316CA6-D44A-4CBD-B514-F8E666A3E426}" type="datetimeFigureOut">
               <a:rPr lang="fr-FR" smtClean="0"/>
-              <a:t>26/04/2020</a:t>
+              <a:t>17/05/2020</a:t>
             </a:fld>
             <a:endParaRPr lang="fr-FR"/>
           </a:p>
@@ -662,7 +669,7 @@
           <a:p>
             <a:fld id="{D9316CA6-D44A-4CBD-B514-F8E666A3E426}" type="datetimeFigureOut">
               <a:rPr lang="fr-FR" smtClean="0"/>
-              <a:t>26/04/2020</a:t>
+              <a:t>17/05/2020</a:t>
             </a:fld>
             <a:endParaRPr lang="fr-FR"/>
           </a:p>
@@ -860,7 +867,7 @@
           <a:p>
             <a:fld id="{D9316CA6-D44A-4CBD-B514-F8E666A3E426}" type="datetimeFigureOut">
               <a:rPr lang="fr-FR" smtClean="0"/>
-              <a:t>26/04/2020</a:t>
+              <a:t>17/05/2020</a:t>
             </a:fld>
             <a:endParaRPr lang="fr-FR"/>
           </a:p>
@@ -1135,7 +1142,7 @@
           <a:p>
             <a:fld id="{D9316CA6-D44A-4CBD-B514-F8E666A3E426}" type="datetimeFigureOut">
               <a:rPr lang="fr-FR" smtClean="0"/>
-              <a:t>26/04/2020</a:t>
+              <a:t>17/05/2020</a:t>
             </a:fld>
             <a:endParaRPr lang="fr-FR"/>
           </a:p>
@@ -1400,7 +1407,7 @@
           <a:p>
             <a:fld id="{D9316CA6-D44A-4CBD-B514-F8E666A3E426}" type="datetimeFigureOut">
               <a:rPr lang="fr-FR" smtClean="0"/>
-              <a:t>26/04/2020</a:t>
+              <a:t>17/05/2020</a:t>
             </a:fld>
             <a:endParaRPr lang="fr-FR"/>
           </a:p>
@@ -1812,7 +1819,7 @@
           <a:p>
             <a:fld id="{D9316CA6-D44A-4CBD-B514-F8E666A3E426}" type="datetimeFigureOut">
               <a:rPr lang="fr-FR" smtClean="0"/>
-              <a:t>26/04/2020</a:t>
+              <a:t>17/05/2020</a:t>
             </a:fld>
             <a:endParaRPr lang="fr-FR"/>
           </a:p>
@@ -1953,7 +1960,7 @@
           <a:p>
             <a:fld id="{D9316CA6-D44A-4CBD-B514-F8E666A3E426}" type="datetimeFigureOut">
               <a:rPr lang="fr-FR" smtClean="0"/>
-              <a:t>26/04/2020</a:t>
+              <a:t>17/05/2020</a:t>
             </a:fld>
             <a:endParaRPr lang="fr-FR"/>
           </a:p>
@@ -2066,7 +2073,7 @@
           <a:p>
             <a:fld id="{D9316CA6-D44A-4CBD-B514-F8E666A3E426}" type="datetimeFigureOut">
               <a:rPr lang="fr-FR" smtClean="0"/>
-              <a:t>26/04/2020</a:t>
+              <a:t>17/05/2020</a:t>
             </a:fld>
             <a:endParaRPr lang="fr-FR"/>
           </a:p>
@@ -2377,7 +2384,7 @@
           <a:p>
             <a:fld id="{D9316CA6-D44A-4CBD-B514-F8E666A3E426}" type="datetimeFigureOut">
               <a:rPr lang="fr-FR" smtClean="0"/>
-              <a:t>26/04/2020</a:t>
+              <a:t>17/05/2020</a:t>
             </a:fld>
             <a:endParaRPr lang="fr-FR"/>
           </a:p>
@@ -2665,7 +2672,7 @@
           <a:p>
             <a:fld id="{D9316CA6-D44A-4CBD-B514-F8E666A3E426}" type="datetimeFigureOut">
               <a:rPr lang="fr-FR" smtClean="0"/>
-              <a:t>26/04/2020</a:t>
+              <a:t>17/05/2020</a:t>
             </a:fld>
             <a:endParaRPr lang="fr-FR"/>
           </a:p>
@@ -2906,7 +2913,7 @@
           <a:p>
             <a:fld id="{D9316CA6-D44A-4CBD-B514-F8E666A3E426}" type="datetimeFigureOut">
               <a:rPr lang="fr-FR" smtClean="0"/>
-              <a:t>26/04/2020</a:t>
+              <a:t>17/05/2020</a:t>
             </a:fld>
             <a:endParaRPr lang="fr-FR"/>
           </a:p>
@@ -3986,6 +3993,813 @@
 </p:sld>
 </file>
 
+<file path=ppt/slides/slide4.xml><?xml version="1.0" encoding="utf-8"?>
+<p:sld xmlns:a="http://schemas.openxmlformats.org/drawingml/2006/main" xmlns:r="http://schemas.openxmlformats.org/officeDocument/2006/relationships" xmlns:p="http://schemas.openxmlformats.org/presentationml/2006/main">
+  <p:cSld>
+    <p:spTree>
+      <p:nvGrpSpPr>
+        <p:cNvPr id="1" name=""/>
+        <p:cNvGrpSpPr/>
+        <p:nvPr/>
+      </p:nvGrpSpPr>
+      <p:grpSpPr>
+        <a:xfrm>
+          <a:off x="0" y="0"/>
+          <a:ext cx="0" cy="0"/>
+          <a:chOff x="0" y="0"/>
+          <a:chExt cx="0" cy="0"/>
+        </a:xfrm>
+      </p:grpSpPr>
+      <p:sp>
+        <p:nvSpPr>
+          <p:cNvPr id="2" name="Titre 1">
+            <a:extLst>
+              <a:ext uri="{FF2B5EF4-FFF2-40B4-BE49-F238E27FC236}">
+                <a16:creationId xmlns:a16="http://schemas.microsoft.com/office/drawing/2014/main" id="{1DD6DD6B-0BEE-409C-803F-CCA3F4D0757F}"/>
+              </a:ext>
+            </a:extLst>
+          </p:cNvPr>
+          <p:cNvSpPr>
+            <a:spLocks noGrp="1"/>
+          </p:cNvSpPr>
+          <p:nvPr>
+            <p:ph type="title"/>
+          </p:nvPr>
+        </p:nvSpPr>
+        <p:spPr/>
+        <p:txBody>
+          <a:bodyPr/>
+          <a:lstStyle/>
+          <a:p>
+            <a:r>
+              <a:rPr lang="fr-FR" dirty="0"/>
+              <a:t>Engagement en course</a:t>
+            </a:r>
+          </a:p>
+        </p:txBody>
+      </p:sp>
+      <p:pic>
+        <p:nvPicPr>
+          <p:cNvPr id="4" name="Espace réservé du contenu 3">
+            <a:extLst>
+              <a:ext uri="{FF2B5EF4-FFF2-40B4-BE49-F238E27FC236}">
+                <a16:creationId xmlns:a16="http://schemas.microsoft.com/office/drawing/2014/main" id="{A84AF3EA-3397-4EF9-A909-D3B2077F1281}"/>
+              </a:ext>
+            </a:extLst>
+          </p:cNvPr>
+          <p:cNvPicPr>
+            <a:picLocks noGrp="1" noChangeAspect="1"/>
+          </p:cNvPicPr>
+          <p:nvPr>
+            <p:ph idx="1"/>
+          </p:nvPr>
+        </p:nvPicPr>
+        <p:blipFill>
+          <a:blip r:embed="rId2"/>
+          <a:stretch>
+            <a:fillRect/>
+          </a:stretch>
+        </p:blipFill>
+        <p:spPr>
+          <a:xfrm>
+            <a:off x="6971071" y="365124"/>
+            <a:ext cx="3996575" cy="6295433"/>
+          </a:xfrm>
+          <a:prstGeom prst="rect">
+            <a:avLst/>
+          </a:prstGeom>
+        </p:spPr>
+      </p:pic>
+      <p:sp>
+        <p:nvSpPr>
+          <p:cNvPr id="8" name="Rectangle : coins arrondis 7">
+            <a:extLst>
+              <a:ext uri="{FF2B5EF4-FFF2-40B4-BE49-F238E27FC236}">
+                <a16:creationId xmlns:a16="http://schemas.microsoft.com/office/drawing/2014/main" id="{88787892-0037-459D-8C56-EE21E53F8376}"/>
+              </a:ext>
+            </a:extLst>
+          </p:cNvPr>
+          <p:cNvSpPr/>
+          <p:nvPr/>
+        </p:nvSpPr>
+        <p:spPr>
+          <a:xfrm>
+            <a:off x="7315200" y="1910848"/>
+            <a:ext cx="316706" cy="346577"/>
+          </a:xfrm>
+          <a:prstGeom prst="roundRect">
+            <a:avLst/>
+          </a:prstGeom>
+          <a:solidFill>
+            <a:schemeClr val="accent1">
+              <a:alpha val="50000"/>
+            </a:schemeClr>
+          </a:solidFill>
+          <a:ln>
+            <a:solidFill>
+              <a:srgbClr val="002060"/>
+            </a:solidFill>
+          </a:ln>
+        </p:spPr>
+        <p:style>
+          <a:lnRef idx="0">
+            <a:scrgbClr r="0" g="0" b="0"/>
+          </a:lnRef>
+          <a:fillRef idx="0">
+            <a:scrgbClr r="0" g="0" b="0"/>
+          </a:fillRef>
+          <a:effectRef idx="0">
+            <a:scrgbClr r="0" g="0" b="0"/>
+          </a:effectRef>
+          <a:fontRef idx="minor">
+            <a:schemeClr val="lt1"/>
+          </a:fontRef>
+        </p:style>
+        <p:txBody>
+          <a:bodyPr rtlCol="0" anchor="ctr"/>
+          <a:lstStyle/>
+          <a:p>
+            <a:pPr algn="ctr"/>
+            <a:r>
+              <a:rPr lang="fr-FR" dirty="0"/>
+              <a:t>1</a:t>
+            </a:r>
+          </a:p>
+        </p:txBody>
+      </p:sp>
+      <p:sp>
+        <p:nvSpPr>
+          <p:cNvPr id="9" name="Rectangle : coins arrondis 8">
+            <a:extLst>
+              <a:ext uri="{FF2B5EF4-FFF2-40B4-BE49-F238E27FC236}">
+                <a16:creationId xmlns:a16="http://schemas.microsoft.com/office/drawing/2014/main" id="{15C5EFDC-0518-442F-9D73-6B83AC30D953}"/>
+              </a:ext>
+            </a:extLst>
+          </p:cNvPr>
+          <p:cNvSpPr/>
+          <p:nvPr/>
+        </p:nvSpPr>
+        <p:spPr>
+          <a:xfrm>
+            <a:off x="7962900" y="3655757"/>
+            <a:ext cx="251460" cy="291403"/>
+          </a:xfrm>
+          <a:prstGeom prst="roundRect">
+            <a:avLst/>
+          </a:prstGeom>
+          <a:solidFill>
+            <a:schemeClr val="accent1">
+              <a:alpha val="50000"/>
+            </a:schemeClr>
+          </a:solidFill>
+          <a:ln>
+            <a:solidFill>
+              <a:srgbClr val="002060"/>
+            </a:solidFill>
+          </a:ln>
+        </p:spPr>
+        <p:style>
+          <a:lnRef idx="0">
+            <a:scrgbClr r="0" g="0" b="0"/>
+          </a:lnRef>
+          <a:fillRef idx="0">
+            <a:scrgbClr r="0" g="0" b="0"/>
+          </a:fillRef>
+          <a:effectRef idx="0">
+            <a:scrgbClr r="0" g="0" b="0"/>
+          </a:effectRef>
+          <a:fontRef idx="minor">
+            <a:schemeClr val="lt1"/>
+          </a:fontRef>
+        </p:style>
+        <p:txBody>
+          <a:bodyPr rtlCol="0" anchor="ctr"/>
+          <a:lstStyle/>
+          <a:p>
+            <a:pPr algn="ctr"/>
+            <a:r>
+              <a:rPr lang="fr-FR" dirty="0"/>
+              <a:t>2</a:t>
+            </a:r>
+          </a:p>
+        </p:txBody>
+      </p:sp>
+      <p:sp>
+        <p:nvSpPr>
+          <p:cNvPr id="10" name="Rectangle : coins arrondis 9">
+            <a:extLst>
+              <a:ext uri="{FF2B5EF4-FFF2-40B4-BE49-F238E27FC236}">
+                <a16:creationId xmlns:a16="http://schemas.microsoft.com/office/drawing/2014/main" id="{8EB3EF10-AA7E-4137-A202-31480ED85D3B}"/>
+              </a:ext>
+            </a:extLst>
+          </p:cNvPr>
+          <p:cNvSpPr/>
+          <p:nvPr/>
+        </p:nvSpPr>
+        <p:spPr>
+          <a:xfrm>
+            <a:off x="9090660" y="4181608"/>
+            <a:ext cx="316706" cy="346577"/>
+          </a:xfrm>
+          <a:prstGeom prst="roundRect">
+            <a:avLst/>
+          </a:prstGeom>
+          <a:solidFill>
+            <a:schemeClr val="accent1">
+              <a:alpha val="50000"/>
+            </a:schemeClr>
+          </a:solidFill>
+          <a:ln>
+            <a:solidFill>
+              <a:srgbClr val="002060"/>
+            </a:solidFill>
+          </a:ln>
+        </p:spPr>
+        <p:style>
+          <a:lnRef idx="0">
+            <a:scrgbClr r="0" g="0" b="0"/>
+          </a:lnRef>
+          <a:fillRef idx="0">
+            <a:scrgbClr r="0" g="0" b="0"/>
+          </a:fillRef>
+          <a:effectRef idx="0">
+            <a:scrgbClr r="0" g="0" b="0"/>
+          </a:effectRef>
+          <a:fontRef idx="minor">
+            <a:schemeClr val="lt1"/>
+          </a:fontRef>
+        </p:style>
+        <p:txBody>
+          <a:bodyPr rtlCol="0" anchor="ctr"/>
+          <a:lstStyle/>
+          <a:p>
+            <a:pPr algn="ctr"/>
+            <a:r>
+              <a:rPr lang="fr-FR" dirty="0"/>
+              <a:t>3</a:t>
+            </a:r>
+          </a:p>
+        </p:txBody>
+      </p:sp>
+    </p:spTree>
+    <p:extLst>
+      <p:ext uri="{BB962C8B-B14F-4D97-AF65-F5344CB8AC3E}">
+        <p14:creationId xmlns:p14="http://schemas.microsoft.com/office/powerpoint/2010/main" val="367066767"/>
+      </p:ext>
+    </p:extLst>
+  </p:cSld>
+  <p:clrMapOvr>
+    <a:masterClrMapping/>
+  </p:clrMapOvr>
+</p:sld>
+</file>
+
+<file path=ppt/slides/slide5.xml><?xml version="1.0" encoding="utf-8"?>
+<p:sld xmlns:a="http://schemas.openxmlformats.org/drawingml/2006/main" xmlns:r="http://schemas.openxmlformats.org/officeDocument/2006/relationships" xmlns:p="http://schemas.openxmlformats.org/presentationml/2006/main">
+  <p:cSld>
+    <p:spTree>
+      <p:nvGrpSpPr>
+        <p:cNvPr id="1" name=""/>
+        <p:cNvGrpSpPr/>
+        <p:nvPr/>
+      </p:nvGrpSpPr>
+      <p:grpSpPr>
+        <a:xfrm>
+          <a:off x="0" y="0"/>
+          <a:ext cx="0" cy="0"/>
+          <a:chOff x="0" y="0"/>
+          <a:chExt cx="0" cy="0"/>
+        </a:xfrm>
+      </p:grpSpPr>
+      <p:sp>
+        <p:nvSpPr>
+          <p:cNvPr id="2" name="Titre 1">
+            <a:extLst>
+              <a:ext uri="{FF2B5EF4-FFF2-40B4-BE49-F238E27FC236}">
+                <a16:creationId xmlns:a16="http://schemas.microsoft.com/office/drawing/2014/main" id="{34988A57-1EA6-49FC-9A5C-DB2D334270D3}"/>
+              </a:ext>
+            </a:extLst>
+          </p:cNvPr>
+          <p:cNvSpPr>
+            <a:spLocks noGrp="1"/>
+          </p:cNvSpPr>
+          <p:nvPr>
+            <p:ph type="title"/>
+          </p:nvPr>
+        </p:nvSpPr>
+        <p:spPr/>
+        <p:txBody>
+          <a:bodyPr/>
+          <a:lstStyle/>
+          <a:p>
+            <a:r>
+              <a:rPr lang="fr-FR" dirty="0"/>
+              <a:t>Détail Panneau Course</a:t>
+            </a:r>
+          </a:p>
+        </p:txBody>
+      </p:sp>
+      <p:pic>
+        <p:nvPicPr>
+          <p:cNvPr id="4" name="Espace réservé du contenu 3">
+            <a:extLst>
+              <a:ext uri="{FF2B5EF4-FFF2-40B4-BE49-F238E27FC236}">
+                <a16:creationId xmlns:a16="http://schemas.microsoft.com/office/drawing/2014/main" id="{32484D2A-430D-4645-9849-714EFABC3132}"/>
+              </a:ext>
+            </a:extLst>
+          </p:cNvPr>
+          <p:cNvPicPr>
+            <a:picLocks noGrp="1" noChangeAspect="1"/>
+          </p:cNvPicPr>
+          <p:nvPr>
+            <p:ph idx="1"/>
+          </p:nvPr>
+        </p:nvPicPr>
+        <p:blipFill>
+          <a:blip r:embed="rId2"/>
+          <a:stretch>
+            <a:fillRect/>
+          </a:stretch>
+        </p:blipFill>
+        <p:spPr>
+          <a:xfrm>
+            <a:off x="6551258" y="242631"/>
+            <a:ext cx="4978989" cy="6492465"/>
+          </a:xfrm>
+          <a:prstGeom prst="rect">
+            <a:avLst/>
+          </a:prstGeom>
+        </p:spPr>
+      </p:pic>
+      <p:sp>
+        <p:nvSpPr>
+          <p:cNvPr id="5" name="Rectangle : coins arrondis 4">
+            <a:extLst>
+              <a:ext uri="{FF2B5EF4-FFF2-40B4-BE49-F238E27FC236}">
+                <a16:creationId xmlns:a16="http://schemas.microsoft.com/office/drawing/2014/main" id="{5D879F8F-2D87-4059-8D49-9C9E1AE54C8C}"/>
+              </a:ext>
+            </a:extLst>
+          </p:cNvPr>
+          <p:cNvSpPr/>
+          <p:nvPr/>
+        </p:nvSpPr>
+        <p:spPr>
+          <a:xfrm>
+            <a:off x="7954297" y="4211596"/>
+            <a:ext cx="316706" cy="346577"/>
+          </a:xfrm>
+          <a:prstGeom prst="roundRect">
+            <a:avLst/>
+          </a:prstGeom>
+          <a:solidFill>
+            <a:schemeClr val="accent1">
+              <a:alpha val="50000"/>
+            </a:schemeClr>
+          </a:solidFill>
+          <a:ln>
+            <a:solidFill>
+              <a:srgbClr val="002060"/>
+            </a:solidFill>
+          </a:ln>
+        </p:spPr>
+        <p:style>
+          <a:lnRef idx="0">
+            <a:scrgbClr r="0" g="0" b="0"/>
+          </a:lnRef>
+          <a:fillRef idx="0">
+            <a:scrgbClr r="0" g="0" b="0"/>
+          </a:fillRef>
+          <a:effectRef idx="0">
+            <a:scrgbClr r="0" g="0" b="0"/>
+          </a:effectRef>
+          <a:fontRef idx="minor">
+            <a:schemeClr val="lt1"/>
+          </a:fontRef>
+        </p:style>
+        <p:txBody>
+          <a:bodyPr rtlCol="0" anchor="ctr"/>
+          <a:lstStyle/>
+          <a:p>
+            <a:pPr algn="ctr"/>
+            <a:r>
+              <a:rPr lang="fr-FR" dirty="0"/>
+              <a:t>1</a:t>
+            </a:r>
+          </a:p>
+        </p:txBody>
+      </p:sp>
+      <p:sp>
+        <p:nvSpPr>
+          <p:cNvPr id="6" name="Rectangle : coins arrondis 5">
+            <a:extLst>
+              <a:ext uri="{FF2B5EF4-FFF2-40B4-BE49-F238E27FC236}">
+                <a16:creationId xmlns:a16="http://schemas.microsoft.com/office/drawing/2014/main" id="{D7BF67D7-C300-4FBA-B801-CA3F184C2FC2}"/>
+              </a:ext>
+            </a:extLst>
+          </p:cNvPr>
+          <p:cNvSpPr/>
+          <p:nvPr/>
+        </p:nvSpPr>
+        <p:spPr>
+          <a:xfrm>
+            <a:off x="6579960" y="4933950"/>
+            <a:ext cx="168403" cy="157623"/>
+          </a:xfrm>
+          <a:prstGeom prst="roundRect">
+            <a:avLst/>
+          </a:prstGeom>
+          <a:solidFill>
+            <a:schemeClr val="accent1">
+              <a:alpha val="50000"/>
+            </a:schemeClr>
+          </a:solidFill>
+          <a:ln>
+            <a:solidFill>
+              <a:srgbClr val="002060"/>
+            </a:solidFill>
+          </a:ln>
+        </p:spPr>
+        <p:style>
+          <a:lnRef idx="0">
+            <a:scrgbClr r="0" g="0" b="0"/>
+          </a:lnRef>
+          <a:fillRef idx="0">
+            <a:scrgbClr r="0" g="0" b="0"/>
+          </a:fillRef>
+          <a:effectRef idx="0">
+            <a:scrgbClr r="0" g="0" b="0"/>
+          </a:effectRef>
+          <a:fontRef idx="minor">
+            <a:schemeClr val="lt1"/>
+          </a:fontRef>
+        </p:style>
+        <p:txBody>
+          <a:bodyPr rtlCol="0" anchor="ctr"/>
+          <a:lstStyle/>
+          <a:p>
+            <a:pPr algn="ctr"/>
+            <a:r>
+              <a:rPr lang="fr-FR" sz="1000" dirty="0"/>
+              <a:t>2</a:t>
+            </a:r>
+          </a:p>
+        </p:txBody>
+      </p:sp>
+      <p:sp>
+        <p:nvSpPr>
+          <p:cNvPr id="7" name="Rectangle : coins arrondis 6">
+            <a:extLst>
+              <a:ext uri="{FF2B5EF4-FFF2-40B4-BE49-F238E27FC236}">
+                <a16:creationId xmlns:a16="http://schemas.microsoft.com/office/drawing/2014/main" id="{375E8775-CB8F-4B86-94C1-2136EBECA57A}"/>
+              </a:ext>
+            </a:extLst>
+          </p:cNvPr>
+          <p:cNvSpPr/>
+          <p:nvPr/>
+        </p:nvSpPr>
+        <p:spPr>
+          <a:xfrm>
+            <a:off x="6579960" y="5156200"/>
+            <a:ext cx="168403" cy="157623"/>
+          </a:xfrm>
+          <a:prstGeom prst="roundRect">
+            <a:avLst/>
+          </a:prstGeom>
+          <a:solidFill>
+            <a:schemeClr val="accent1">
+              <a:alpha val="50000"/>
+            </a:schemeClr>
+          </a:solidFill>
+          <a:ln>
+            <a:solidFill>
+              <a:srgbClr val="002060"/>
+            </a:solidFill>
+          </a:ln>
+        </p:spPr>
+        <p:style>
+          <a:lnRef idx="0">
+            <a:scrgbClr r="0" g="0" b="0"/>
+          </a:lnRef>
+          <a:fillRef idx="0">
+            <a:scrgbClr r="0" g="0" b="0"/>
+          </a:fillRef>
+          <a:effectRef idx="0">
+            <a:scrgbClr r="0" g="0" b="0"/>
+          </a:effectRef>
+          <a:fontRef idx="minor">
+            <a:schemeClr val="lt1"/>
+          </a:fontRef>
+        </p:style>
+        <p:txBody>
+          <a:bodyPr rtlCol="0" anchor="ctr"/>
+          <a:lstStyle/>
+          <a:p>
+            <a:pPr algn="ctr"/>
+            <a:r>
+              <a:rPr lang="fr-FR" sz="1000" dirty="0"/>
+              <a:t>3</a:t>
+            </a:r>
+          </a:p>
+        </p:txBody>
+      </p:sp>
+      <p:sp>
+        <p:nvSpPr>
+          <p:cNvPr id="8" name="Rectangle : coins arrondis 7">
+            <a:extLst>
+              <a:ext uri="{FF2B5EF4-FFF2-40B4-BE49-F238E27FC236}">
+                <a16:creationId xmlns:a16="http://schemas.microsoft.com/office/drawing/2014/main" id="{2AD63958-5B74-4916-9548-1DD3F079B717}"/>
+              </a:ext>
+            </a:extLst>
+          </p:cNvPr>
+          <p:cNvSpPr/>
+          <p:nvPr/>
+        </p:nvSpPr>
+        <p:spPr>
+          <a:xfrm>
+            <a:off x="6579960" y="5441950"/>
+            <a:ext cx="168403" cy="157623"/>
+          </a:xfrm>
+          <a:prstGeom prst="roundRect">
+            <a:avLst/>
+          </a:prstGeom>
+          <a:solidFill>
+            <a:schemeClr val="accent1">
+              <a:alpha val="50000"/>
+            </a:schemeClr>
+          </a:solidFill>
+          <a:ln>
+            <a:solidFill>
+              <a:srgbClr val="002060"/>
+            </a:solidFill>
+          </a:ln>
+        </p:spPr>
+        <p:style>
+          <a:lnRef idx="0">
+            <a:scrgbClr r="0" g="0" b="0"/>
+          </a:lnRef>
+          <a:fillRef idx="0">
+            <a:scrgbClr r="0" g="0" b="0"/>
+          </a:fillRef>
+          <a:effectRef idx="0">
+            <a:scrgbClr r="0" g="0" b="0"/>
+          </a:effectRef>
+          <a:fontRef idx="minor">
+            <a:schemeClr val="lt1"/>
+          </a:fontRef>
+        </p:style>
+        <p:txBody>
+          <a:bodyPr rtlCol="0" anchor="ctr"/>
+          <a:lstStyle/>
+          <a:p>
+            <a:pPr algn="ctr"/>
+            <a:r>
+              <a:rPr lang="fr-FR" sz="1000" dirty="0"/>
+              <a:t>4</a:t>
+            </a:r>
+          </a:p>
+        </p:txBody>
+      </p:sp>
+      <p:sp>
+        <p:nvSpPr>
+          <p:cNvPr id="9" name="Rectangle : coins arrondis 8">
+            <a:extLst>
+              <a:ext uri="{FF2B5EF4-FFF2-40B4-BE49-F238E27FC236}">
+                <a16:creationId xmlns:a16="http://schemas.microsoft.com/office/drawing/2014/main" id="{E6914231-727B-4995-A4A0-98365AE5EB37}"/>
+              </a:ext>
+            </a:extLst>
+          </p:cNvPr>
+          <p:cNvSpPr/>
+          <p:nvPr/>
+        </p:nvSpPr>
+        <p:spPr>
+          <a:xfrm>
+            <a:off x="6579960" y="5664200"/>
+            <a:ext cx="168403" cy="157623"/>
+          </a:xfrm>
+          <a:prstGeom prst="roundRect">
+            <a:avLst/>
+          </a:prstGeom>
+          <a:solidFill>
+            <a:schemeClr val="accent1">
+              <a:alpha val="50000"/>
+            </a:schemeClr>
+          </a:solidFill>
+          <a:ln>
+            <a:solidFill>
+              <a:srgbClr val="002060"/>
+            </a:solidFill>
+          </a:ln>
+        </p:spPr>
+        <p:style>
+          <a:lnRef idx="0">
+            <a:scrgbClr r="0" g="0" b="0"/>
+          </a:lnRef>
+          <a:fillRef idx="0">
+            <a:scrgbClr r="0" g="0" b="0"/>
+          </a:fillRef>
+          <a:effectRef idx="0">
+            <a:scrgbClr r="0" g="0" b="0"/>
+          </a:effectRef>
+          <a:fontRef idx="minor">
+            <a:schemeClr val="lt1"/>
+          </a:fontRef>
+        </p:style>
+        <p:txBody>
+          <a:bodyPr rtlCol="0" anchor="ctr"/>
+          <a:lstStyle/>
+          <a:p>
+            <a:pPr algn="ctr"/>
+            <a:r>
+              <a:rPr lang="fr-FR" sz="1000" dirty="0"/>
+              <a:t>5</a:t>
+            </a:r>
+          </a:p>
+        </p:txBody>
+      </p:sp>
+      <p:sp>
+        <p:nvSpPr>
+          <p:cNvPr id="11" name="Rectangle : coins arrondis 10">
+            <a:extLst>
+              <a:ext uri="{FF2B5EF4-FFF2-40B4-BE49-F238E27FC236}">
+                <a16:creationId xmlns:a16="http://schemas.microsoft.com/office/drawing/2014/main" id="{97AB56AC-EA75-4F34-A35E-01A03A8E4CCE}"/>
+              </a:ext>
+            </a:extLst>
+          </p:cNvPr>
+          <p:cNvSpPr/>
+          <p:nvPr/>
+        </p:nvSpPr>
+        <p:spPr>
+          <a:xfrm>
+            <a:off x="6579960" y="5940578"/>
+            <a:ext cx="168403" cy="157623"/>
+          </a:xfrm>
+          <a:prstGeom prst="roundRect">
+            <a:avLst/>
+          </a:prstGeom>
+          <a:solidFill>
+            <a:schemeClr val="accent1">
+              <a:alpha val="50000"/>
+            </a:schemeClr>
+          </a:solidFill>
+          <a:ln>
+            <a:solidFill>
+              <a:srgbClr val="002060"/>
+            </a:solidFill>
+          </a:ln>
+        </p:spPr>
+        <p:style>
+          <a:lnRef idx="0">
+            <a:scrgbClr r="0" g="0" b="0"/>
+          </a:lnRef>
+          <a:fillRef idx="0">
+            <a:scrgbClr r="0" g="0" b="0"/>
+          </a:fillRef>
+          <a:effectRef idx="0">
+            <a:scrgbClr r="0" g="0" b="0"/>
+          </a:effectRef>
+          <a:fontRef idx="minor">
+            <a:schemeClr val="lt1"/>
+          </a:fontRef>
+        </p:style>
+        <p:txBody>
+          <a:bodyPr rtlCol="0" anchor="ctr"/>
+          <a:lstStyle/>
+          <a:p>
+            <a:pPr algn="ctr"/>
+            <a:r>
+              <a:rPr lang="fr-FR" sz="1000" dirty="0"/>
+              <a:t>6</a:t>
+            </a:r>
+          </a:p>
+        </p:txBody>
+      </p:sp>
+      <p:sp>
+        <p:nvSpPr>
+          <p:cNvPr id="12" name="Rectangle : coins arrondis 11">
+            <a:extLst>
+              <a:ext uri="{FF2B5EF4-FFF2-40B4-BE49-F238E27FC236}">
+                <a16:creationId xmlns:a16="http://schemas.microsoft.com/office/drawing/2014/main" id="{8557675E-C1F3-4437-98BC-AD53AC414F9C}"/>
+              </a:ext>
+            </a:extLst>
+          </p:cNvPr>
+          <p:cNvSpPr/>
+          <p:nvPr/>
+        </p:nvSpPr>
+        <p:spPr>
+          <a:xfrm>
+            <a:off x="6579960" y="6162828"/>
+            <a:ext cx="168403" cy="157623"/>
+          </a:xfrm>
+          <a:prstGeom prst="roundRect">
+            <a:avLst/>
+          </a:prstGeom>
+          <a:solidFill>
+            <a:schemeClr val="accent1">
+              <a:alpha val="50000"/>
+            </a:schemeClr>
+          </a:solidFill>
+          <a:ln>
+            <a:solidFill>
+              <a:srgbClr val="002060"/>
+            </a:solidFill>
+          </a:ln>
+        </p:spPr>
+        <p:style>
+          <a:lnRef idx="0">
+            <a:scrgbClr r="0" g="0" b="0"/>
+          </a:lnRef>
+          <a:fillRef idx="0">
+            <a:scrgbClr r="0" g="0" b="0"/>
+          </a:fillRef>
+          <a:effectRef idx="0">
+            <a:scrgbClr r="0" g="0" b="0"/>
+          </a:effectRef>
+          <a:fontRef idx="minor">
+            <a:schemeClr val="lt1"/>
+          </a:fontRef>
+        </p:style>
+        <p:txBody>
+          <a:bodyPr rtlCol="0" anchor="ctr"/>
+          <a:lstStyle/>
+          <a:p>
+            <a:pPr algn="ctr"/>
+            <a:r>
+              <a:rPr lang="fr-FR" sz="1000" dirty="0"/>
+              <a:t>7</a:t>
+            </a:r>
+          </a:p>
+        </p:txBody>
+      </p:sp>
+      <p:sp>
+        <p:nvSpPr>
+          <p:cNvPr id="13" name="Rectangle : coins arrondis 12">
+            <a:extLst>
+              <a:ext uri="{FF2B5EF4-FFF2-40B4-BE49-F238E27FC236}">
+                <a16:creationId xmlns:a16="http://schemas.microsoft.com/office/drawing/2014/main" id="{72B86713-2262-4CE0-BDC8-47DC8C86A86F}"/>
+              </a:ext>
+            </a:extLst>
+          </p:cNvPr>
+          <p:cNvSpPr/>
+          <p:nvPr/>
+        </p:nvSpPr>
+        <p:spPr>
+          <a:xfrm>
+            <a:off x="6579960" y="6448578"/>
+            <a:ext cx="168403" cy="157623"/>
+          </a:xfrm>
+          <a:prstGeom prst="roundRect">
+            <a:avLst/>
+          </a:prstGeom>
+          <a:solidFill>
+            <a:schemeClr val="accent1">
+              <a:alpha val="50000"/>
+            </a:schemeClr>
+          </a:solidFill>
+          <a:ln>
+            <a:solidFill>
+              <a:srgbClr val="002060"/>
+            </a:solidFill>
+          </a:ln>
+        </p:spPr>
+        <p:style>
+          <a:lnRef idx="0">
+            <a:scrgbClr r="0" g="0" b="0"/>
+          </a:lnRef>
+          <a:fillRef idx="0">
+            <a:scrgbClr r="0" g="0" b="0"/>
+          </a:fillRef>
+          <a:effectRef idx="0">
+            <a:scrgbClr r="0" g="0" b="0"/>
+          </a:effectRef>
+          <a:fontRef idx="minor">
+            <a:schemeClr val="lt1"/>
+          </a:fontRef>
+        </p:style>
+        <p:txBody>
+          <a:bodyPr rtlCol="0" anchor="ctr"/>
+          <a:lstStyle/>
+          <a:p>
+            <a:pPr algn="ctr"/>
+            <a:r>
+              <a:rPr lang="fr-FR" sz="1000" dirty="0"/>
+              <a:t>8</a:t>
+            </a:r>
+          </a:p>
+        </p:txBody>
+      </p:sp>
+    </p:spTree>
+    <p:extLst>
+      <p:ext uri="{BB962C8B-B14F-4D97-AF65-F5344CB8AC3E}">
+        <p14:creationId xmlns:p14="http://schemas.microsoft.com/office/powerpoint/2010/main" val="2208770062"/>
+      </p:ext>
+    </p:extLst>
+  </p:cSld>
+  <p:clrMapOvr>
+    <a:masterClrMapping/>
+  </p:clrMapOvr>
+</p:sld>
+</file>
+
 <file path=ppt/theme/theme1.xml><?xml version="1.0" encoding="utf-8"?>
 <a:theme xmlns:a="http://schemas.openxmlformats.org/drawingml/2006/main" name="Thème Office">
   <a:themeElements>

</xml_diff>